<commit_message>
Update the code with pure ppt
</commit_message>
<xml_diff>
--- a/First_presentation.pptx
+++ b/First_presentation.pptx
@@ -6,8 +6,6 @@
   </p:sldMasterIdLst>
   <p:sldIdLst>
     <p:sldId id="256" r:id="rId7"/>
-    <p:sldId id="257" r:id="rId8"/>
-    <p:sldId id="258" r:id="rId9"/>
   </p:sldIdLst>
   <p:sldSz cx="9144000" cy="6858000" type="screen4x3"/>
   <p:notesSz cx="6858000" cy="9144000"/>
@@ -3106,7 +3104,7 @@
           <a:lstStyle/>
           <a:p>
             <a:r>
-              <a:t>ChatGPT in Software</a:t>
+              <a:t>ChatGPT in Medicine</a:t>
             </a:r>
           </a:p>
         </p:txBody>
@@ -3128,142 +3126,6 @@
           <a:p>
             <a:r>
               <a:t>Created by Big Data Lab</a:t>
-            </a:r>
-          </a:p>
-        </p:txBody>
-      </p:sp>
-    </p:spTree>
-  </p:cSld>
-  <p:clrMapOvr>
-    <a:masterClrMapping/>
-  </p:clrMapOvr>
-</p:sld>
-</file>
-
-<file path=ppt/slides/slide2.xml><?xml version="1.0" encoding="utf-8"?>
-<p:sld xmlns:a="http://schemas.openxmlformats.org/drawingml/2006/main" xmlns:p="http://schemas.openxmlformats.org/presentationml/2006/main" xmlns:r="http://schemas.openxmlformats.org/officeDocument/2006/relationships">
-  <p:cSld>
-    <p:spTree>
-      <p:nvGrpSpPr>
-        <p:cNvPr id="1" name=""/>
-        <p:cNvGrpSpPr/>
-        <p:nvPr/>
-      </p:nvGrpSpPr>
-      <p:grpSpPr/>
-      <p:sp>
-        <p:nvSpPr>
-          <p:cNvPr id="2" name="Title 1"/>
-          <p:cNvSpPr>
-            <a:spLocks noGrp="1"/>
-          </p:cNvSpPr>
-          <p:nvPr>
-            <p:ph type="title"/>
-          </p:nvPr>
-        </p:nvSpPr>
-        <p:spPr/>
-        <p:txBody>
-          <a:bodyPr/>
-          <a:lstStyle/>
-          <a:p>
-            <a:r>
-              <a:t>ChatGPT: An AI Chatbot Powered by GPT-3</a:t>
-            </a:r>
-          </a:p>
-        </p:txBody>
-      </p:sp>
-      <p:sp>
-        <p:nvSpPr>
-          <p:cNvPr id="3" name="TextBox 2"/>
-          <p:cNvSpPr txBox="1"/>
-          <p:nvPr/>
-        </p:nvSpPr>
-        <p:spPr>
-          <a:xfrm>
-            <a:off x="2743200" y="1371600"/>
-            <a:ext cx="2743200" cy="914400"/>
-          </a:xfrm>
-          <a:prstGeom prst="rect">
-            <a:avLst/>
-          </a:prstGeom>
-          <a:noFill/>
-        </p:spPr>
-        <p:txBody>
-          <a:bodyPr wrap="none">
-            <a:spAutoFit/>
-          </a:bodyPr>
-          <a:lstStyle/>
-          <a:p/>
-          <a:p>
-            <a:r>
-              <a:t>This is a paragraph in the second slide!</a:t>
-            </a:r>
-          </a:p>
-        </p:txBody>
-      </p:sp>
-    </p:spTree>
-  </p:cSld>
-  <p:clrMapOvr>
-    <a:masterClrMapping/>
-  </p:clrMapOvr>
-</p:sld>
-</file>
-
-<file path=ppt/slides/slide3.xml><?xml version="1.0" encoding="utf-8"?>
-<p:sld xmlns:a="http://schemas.openxmlformats.org/drawingml/2006/main" xmlns:p="http://schemas.openxmlformats.org/presentationml/2006/main" xmlns:r="http://schemas.openxmlformats.org/officeDocument/2006/relationships">
-  <p:cSld>
-    <p:spTree>
-      <p:nvGrpSpPr>
-        <p:cNvPr id="1" name=""/>
-        <p:cNvGrpSpPr/>
-        <p:nvPr/>
-      </p:nvGrpSpPr>
-      <p:grpSpPr/>
-      <p:sp>
-        <p:nvSpPr>
-          <p:cNvPr id="2" name="Title 1"/>
-          <p:cNvSpPr>
-            <a:spLocks noGrp="1"/>
-          </p:cNvSpPr>
-          <p:nvPr>
-            <p:ph type="title"/>
-          </p:nvPr>
-        </p:nvSpPr>
-        <p:spPr/>
-        <p:txBody>
-          <a:bodyPr/>
-          <a:lstStyle/>
-          <a:p>
-            <a:r>
-              <a:t>Seamlessly integrate automated customer service into your software.</a:t>
-            </a:r>
-          </a:p>
-        </p:txBody>
-      </p:sp>
-      <p:sp>
-        <p:nvSpPr>
-          <p:cNvPr id="3" name="TextBox 2"/>
-          <p:cNvSpPr txBox="1"/>
-          <p:nvPr/>
-        </p:nvSpPr>
-        <p:spPr>
-          <a:xfrm>
-            <a:off x="2743200" y="1371600"/>
-            <a:ext cx="2743200" cy="914400"/>
-          </a:xfrm>
-          <a:prstGeom prst="rect">
-            <a:avLst/>
-          </a:prstGeom>
-          <a:noFill/>
-        </p:spPr>
-        <p:txBody>
-          <a:bodyPr wrap="none">
-            <a:spAutoFit/>
-          </a:bodyPr>
-          <a:lstStyle/>
-          <a:p/>
-          <a:p>
-            <a:r>
-              <a:t>This is a paragraph in the third slide!</a:t>
             </a:r>
           </a:p>
         </p:txBody>

</xml_diff>

<commit_message>
Upload the new file
</commit_message>
<xml_diff>
--- a/First_presentation.pptx
+++ b/First_presentation.pptx
@@ -6,6 +6,10 @@
   </p:sldMasterIdLst>
   <p:sldIdLst>
     <p:sldId id="256" r:id="rId7"/>
+    <p:sldId id="257" r:id="rId8"/>
+    <p:sldId id="258" r:id="rId9"/>
+    <p:sldId id="259" r:id="rId10"/>
+    <p:sldId id="260" r:id="rId11"/>
   </p:sldIdLst>
   <p:sldSz cx="9144000" cy="6858000" type="screen4x3"/>
   <p:notesSz cx="6858000" cy="9144000"/>
@@ -3104,7 +3108,7 @@
           <a:lstStyle/>
           <a:p>
             <a:r>
-              <a:t>ChatGPT in Medicine</a:t>
+              <a:t>ChatGPT in Big Data</a:t>
             </a:r>
           </a:p>
         </p:txBody>
@@ -3126,6 +3130,378 @@
           <a:p>
             <a:r>
               <a:t>Created by Big Data Lab</a:t>
+            </a:r>
+          </a:p>
+        </p:txBody>
+      </p:sp>
+    </p:spTree>
+  </p:cSld>
+  <p:clrMapOvr>
+    <a:masterClrMapping/>
+  </p:clrMapOvr>
+</p:sld>
+</file>
+
+<file path=ppt/slides/slide2.xml><?xml version="1.0" encoding="utf-8"?>
+<p:sld xmlns:a="http://schemas.openxmlformats.org/drawingml/2006/main" xmlns:p="http://schemas.openxmlformats.org/presentationml/2006/main" xmlns:r="http://schemas.openxmlformats.org/officeDocument/2006/relationships">
+  <p:cSld>
+    <p:spTree>
+      <p:nvGrpSpPr>
+        <p:cNvPr id="1" name=""/>
+        <p:cNvGrpSpPr/>
+        <p:nvPr/>
+      </p:nvGrpSpPr>
+      <p:grpSpPr/>
+      <p:sp>
+        <p:nvSpPr>
+          <p:cNvPr id="2" name="Title 1"/>
+          <p:cNvSpPr>
+            <a:spLocks noGrp="1"/>
+          </p:cNvSpPr>
+          <p:nvPr>
+            <p:ph type="title"/>
+          </p:nvPr>
+        </p:nvSpPr>
+        <p:spPr/>
+        <p:txBody>
+          <a:bodyPr/>
+          <a:lstStyle/>
+          <a:p>
+            <a:r>
+              <a:t>ChatGPT and its application in Big Data</a:t>
+            </a:r>
+          </a:p>
+        </p:txBody>
+      </p:sp>
+      <p:sp>
+        <p:nvSpPr>
+          <p:cNvPr id="3" name="TextBox 2"/>
+          <p:cNvSpPr txBox="1"/>
+          <p:nvPr/>
+        </p:nvSpPr>
+        <p:spPr>
+          <a:xfrm>
+            <a:off x="914400" y="1828800"/>
+            <a:ext cx="5486400" cy="1828800"/>
+          </a:xfrm>
+          <a:prstGeom prst="rect">
+            <a:avLst/>
+          </a:prstGeom>
+          <a:noFill/>
+        </p:spPr>
+        <p:txBody>
+          <a:bodyPr wrap="square">
+            <a:spAutoFit/>
+          </a:bodyPr>
+          <a:lstStyle/>
+          <a:p/>
+          <a:p>
+            <a:pPr>
+              <a:defRPr sz="1600" b="0">
+                <a:latin typeface="Calibri"/>
+              </a:defRPr>
+            </a:pPr>
+            <a:r>
+              <a:t>ChatGPT as a conversational AI tool in Big Data</a:t>
+            </a:r>
+          </a:p>
+          <a:p>
+            <a:pPr>
+              <a:defRPr sz="1600" b="0">
+                <a:latin typeface="Calibri"/>
+              </a:defRPr>
+            </a:pPr>
+            <a:r>
+              <a:t>Improving data analysis and decision-making through ChatGPT</a:t>
+            </a:r>
+          </a:p>
+          <a:p>
+            <a:pPr>
+              <a:defRPr sz="1600" b="0">
+                <a:latin typeface="Calibri"/>
+              </a:defRPr>
+            </a:pPr>
+            <a:r>
+              <a:t>Enhancing customer experiences with ChatGPT in Big Data</a:t>
+            </a:r>
+          </a:p>
+        </p:txBody>
+      </p:sp>
+    </p:spTree>
+  </p:cSld>
+  <p:clrMapOvr>
+    <a:masterClrMapping/>
+  </p:clrMapOvr>
+</p:sld>
+</file>
+
+<file path=ppt/slides/slide3.xml><?xml version="1.0" encoding="utf-8"?>
+<p:sld xmlns:a="http://schemas.openxmlformats.org/drawingml/2006/main" xmlns:p="http://schemas.openxmlformats.org/presentationml/2006/main" xmlns:r="http://schemas.openxmlformats.org/officeDocument/2006/relationships">
+  <p:cSld>
+    <p:spTree>
+      <p:nvGrpSpPr>
+        <p:cNvPr id="1" name=""/>
+        <p:cNvGrpSpPr/>
+        <p:nvPr/>
+      </p:nvGrpSpPr>
+      <p:grpSpPr/>
+      <p:sp>
+        <p:nvSpPr>
+          <p:cNvPr id="2" name="Title 1"/>
+          <p:cNvSpPr>
+            <a:spLocks noGrp="1"/>
+          </p:cNvSpPr>
+          <p:nvPr>
+            <p:ph type="title"/>
+          </p:nvPr>
+        </p:nvSpPr>
+        <p:spPr/>
+        <p:txBody>
+          <a:bodyPr/>
+          <a:lstStyle/>
+          <a:p>
+            <a:r>
+              <a:t>How ChatGPT aids in Big Data Collection and Analysis</a:t>
+            </a:r>
+          </a:p>
+        </p:txBody>
+      </p:sp>
+      <p:sp>
+        <p:nvSpPr>
+          <p:cNvPr id="3" name="TextBox 2"/>
+          <p:cNvSpPr txBox="1"/>
+          <p:nvPr/>
+        </p:nvSpPr>
+        <p:spPr>
+          <a:xfrm>
+            <a:off x="914400" y="1828800"/>
+            <a:ext cx="5486400" cy="1828800"/>
+          </a:xfrm>
+          <a:prstGeom prst="rect">
+            <a:avLst/>
+          </a:prstGeom>
+          <a:noFill/>
+        </p:spPr>
+        <p:txBody>
+          <a:bodyPr wrap="square">
+            <a:spAutoFit/>
+          </a:bodyPr>
+          <a:lstStyle/>
+          <a:p/>
+          <a:p>
+            <a:pPr>
+              <a:defRPr sz="1600" b="0">
+                <a:latin typeface="Calibri"/>
+              </a:defRPr>
+            </a:pPr>
+            <a:r>
+              <a:t>ChatGPT for data collection and extraction from unstructured sources</a:t>
+            </a:r>
+          </a:p>
+          <a:p>
+            <a:pPr>
+              <a:defRPr sz="1600" b="0">
+                <a:latin typeface="Calibri"/>
+              </a:defRPr>
+            </a:pPr>
+            <a:r>
+              <a:t>ChatGPT's ability to perform automated data analysis and summarization</a:t>
+            </a:r>
+          </a:p>
+          <a:p>
+            <a:pPr>
+              <a:defRPr sz="1600" b="0">
+                <a:latin typeface="Calibri"/>
+              </a:defRPr>
+            </a:pPr>
+            <a:r>
+              <a:t>ChatGPT's role in data cleansing and pre-processing for effective analysis</a:t>
+            </a:r>
+          </a:p>
+        </p:txBody>
+      </p:sp>
+    </p:spTree>
+  </p:cSld>
+  <p:clrMapOvr>
+    <a:masterClrMapping/>
+  </p:clrMapOvr>
+</p:sld>
+</file>
+
+<file path=ppt/slides/slide4.xml><?xml version="1.0" encoding="utf-8"?>
+<p:sld xmlns:a="http://schemas.openxmlformats.org/drawingml/2006/main" xmlns:p="http://schemas.openxmlformats.org/presentationml/2006/main" xmlns:r="http://schemas.openxmlformats.org/officeDocument/2006/relationships">
+  <p:cSld>
+    <p:spTree>
+      <p:nvGrpSpPr>
+        <p:cNvPr id="1" name=""/>
+        <p:cNvGrpSpPr/>
+        <p:nvPr/>
+      </p:nvGrpSpPr>
+      <p:grpSpPr/>
+      <p:sp>
+        <p:nvSpPr>
+          <p:cNvPr id="2" name="Title 1"/>
+          <p:cNvSpPr>
+            <a:spLocks noGrp="1"/>
+          </p:cNvSpPr>
+          <p:nvPr>
+            <p:ph type="title"/>
+          </p:nvPr>
+        </p:nvSpPr>
+        <p:spPr/>
+        <p:txBody>
+          <a:bodyPr/>
+          <a:lstStyle/>
+          <a:p>
+            <a:r>
+              <a:t>Benefits of ChatGPT in Big Data Processing</a:t>
+            </a:r>
+          </a:p>
+        </p:txBody>
+      </p:sp>
+      <p:sp>
+        <p:nvSpPr>
+          <p:cNvPr id="3" name="TextBox 2"/>
+          <p:cNvSpPr txBox="1"/>
+          <p:nvPr/>
+        </p:nvSpPr>
+        <p:spPr>
+          <a:xfrm>
+            <a:off x="914400" y="1828800"/>
+            <a:ext cx="5486400" cy="1828800"/>
+          </a:xfrm>
+          <a:prstGeom prst="rect">
+            <a:avLst/>
+          </a:prstGeom>
+          <a:noFill/>
+        </p:spPr>
+        <p:txBody>
+          <a:bodyPr wrap="square">
+            <a:spAutoFit/>
+          </a:bodyPr>
+          <a:lstStyle/>
+          <a:p/>
+          <a:p>
+            <a:pPr>
+              <a:defRPr sz="1600" b="0">
+                <a:latin typeface="Calibri"/>
+              </a:defRPr>
+            </a:pPr>
+            <a:r>
+              <a:t>ChatGPT's ability to process large amounts of data in real-time</a:t>
+            </a:r>
+          </a:p>
+          <a:p>
+            <a:pPr>
+              <a:defRPr sz="1600" b="0">
+                <a:latin typeface="Calibri"/>
+              </a:defRPr>
+            </a:pPr>
+            <a:r>
+              <a:t>Enhanced accuracy and efficiency through ChatGPT's natural language processing capabilities</a:t>
+            </a:r>
+          </a:p>
+          <a:p>
+            <a:pPr>
+              <a:defRPr sz="1600" b="0">
+                <a:latin typeface="Calibri"/>
+              </a:defRPr>
+            </a:pPr>
+            <a:r>
+              <a:t>ChatGPT's automated data processing and analysis leading to reduced time and operational costs</a:t>
+            </a:r>
+          </a:p>
+        </p:txBody>
+      </p:sp>
+    </p:spTree>
+  </p:cSld>
+  <p:clrMapOvr>
+    <a:masterClrMapping/>
+  </p:clrMapOvr>
+</p:sld>
+</file>
+
+<file path=ppt/slides/slide5.xml><?xml version="1.0" encoding="utf-8"?>
+<p:sld xmlns:a="http://schemas.openxmlformats.org/drawingml/2006/main" xmlns:p="http://schemas.openxmlformats.org/presentationml/2006/main" xmlns:r="http://schemas.openxmlformats.org/officeDocument/2006/relationships">
+  <p:cSld>
+    <p:spTree>
+      <p:nvGrpSpPr>
+        <p:cNvPr id="1" name=""/>
+        <p:cNvGrpSpPr/>
+        <p:nvPr/>
+      </p:nvGrpSpPr>
+      <p:grpSpPr/>
+      <p:sp>
+        <p:nvSpPr>
+          <p:cNvPr id="2" name="Title 1"/>
+          <p:cNvSpPr>
+            <a:spLocks noGrp="1"/>
+          </p:cNvSpPr>
+          <p:nvPr>
+            <p:ph type="title"/>
+          </p:nvPr>
+        </p:nvSpPr>
+        <p:spPr/>
+        <p:txBody>
+          <a:bodyPr/>
+          <a:lstStyle/>
+          <a:p>
+            <a:r>
+              <a:t>ChatGPT and its Role in Predictive Analytics</a:t>
+            </a:r>
+          </a:p>
+        </p:txBody>
+      </p:sp>
+      <p:sp>
+        <p:nvSpPr>
+          <p:cNvPr id="3" name="TextBox 2"/>
+          <p:cNvSpPr txBox="1"/>
+          <p:nvPr/>
+        </p:nvSpPr>
+        <p:spPr>
+          <a:xfrm>
+            <a:off x="914400" y="1828800"/>
+            <a:ext cx="5486400" cy="1828800"/>
+          </a:xfrm>
+          <a:prstGeom prst="rect">
+            <a:avLst/>
+          </a:prstGeom>
+          <a:noFill/>
+        </p:spPr>
+        <p:txBody>
+          <a:bodyPr wrap="square">
+            <a:spAutoFit/>
+          </a:bodyPr>
+          <a:lstStyle/>
+          <a:p/>
+          <a:p>
+            <a:pPr>
+              <a:defRPr sz="1600" b="0">
+                <a:latin typeface="Calibri"/>
+              </a:defRPr>
+            </a:pPr>
+            <a:r>
+              <a:t>ChatGPT's ability to identify patterns and trends in Big Data</a:t>
+            </a:r>
+          </a:p>
+          <a:p>
+            <a:pPr>
+              <a:defRPr sz="1600" b="0">
+                <a:latin typeface="Calibri"/>
+              </a:defRPr>
+            </a:pPr>
+            <a:r>
+              <a:t>Utilizing ChatGPT for accurate predictions and forecasting</a:t>
+            </a:r>
+          </a:p>
+          <a:p>
+            <a:pPr>
+              <a:defRPr sz="1600" b="0">
+                <a:latin typeface="Calibri"/>
+              </a:defRPr>
+            </a:pPr>
+            <a:r>
+              <a:t>Improved business outcomes through the integration of ChatGPT in Big Data predictive analytics</a:t>
             </a:r>
           </a:p>
         </p:txBody>

</xml_diff>